<commit_message>
Atualização de slides de aulas
</commit_message>
<xml_diff>
--- a/01 Classes/Aula 02, 03, 04 Desenvolvimento Web Caracterização - HTML.pptx
+++ b/01 Classes/Aula 02, 03, 04 Desenvolvimento Web Caracterização - HTML.pptx
@@ -15691,6 +15691,14 @@
                 </a:solidFill>
               </a:rPr>
               <a:t>Fechamento</a:t>
+            </a:r>
+            <a:r>
+              <a:rPr lang="en-US" b="1">
+                <a:solidFill>
+                  <a:srgbClr val="0070C0"/>
+                </a:solidFill>
+              </a:rPr>
+              <a:t> *</a:t>
             </a:r>
             <a:endParaRPr lang="en-US" b="1" dirty="0">
               <a:solidFill>

</xml_diff>

<commit_message>
Atualização slides de aulas SSH
</commit_message>
<xml_diff>
--- a/01 Classes/Aula 02, 03, 04 Desenvolvimento Web Caracterização - HTML.pptx
+++ b/01 Classes/Aula 02, 03, 04 Desenvolvimento Web Caracterização - HTML.pptx
@@ -8686,63 +8686,63 @@
               <a:buNone/>
             </a:pPr>
             <a:r>
-              <a:rPr lang="pt-BR" sz="3200" dirty="0">
-                <a:latin typeface="Times New Roman" panose="02020603050405020304" pitchFamily="18" charset="0"/>
-                <a:cs typeface="Times New Roman" panose="02020603050405020304" pitchFamily="18" charset="0"/>
-              </a:rPr>
-              <a:t>11. </a:t>
-            </a:r>
-            <a:r>
-              <a:rPr lang="pt-BR" sz="3200" b="1" dirty="0" err="1">
+              <a:rPr lang="pt-BR" sz="2400" dirty="0">
+                <a:latin typeface="Times New Roman" panose="02020603050405020304" pitchFamily="18" charset="0"/>
+                <a:cs typeface="Times New Roman" panose="02020603050405020304" pitchFamily="18" charset="0"/>
+              </a:rPr>
+              <a:t>15. </a:t>
+            </a:r>
+            <a:r>
+              <a:rPr lang="pt-BR" sz="2400" b="1" dirty="0" err="1">
                 <a:latin typeface="Times New Roman" panose="02020603050405020304" pitchFamily="18" charset="0"/>
                 <a:cs typeface="Times New Roman" panose="02020603050405020304" pitchFamily="18" charset="0"/>
               </a:rPr>
               <a:t>git</a:t>
             </a:r>
             <a:r>
-              <a:rPr lang="pt-BR" sz="3200" b="1" dirty="0">
+              <a:rPr lang="pt-BR" sz="2400" b="1" dirty="0">
                 <a:latin typeface="Times New Roman" panose="02020603050405020304" pitchFamily="18" charset="0"/>
                 <a:cs typeface="Times New Roman" panose="02020603050405020304" pitchFamily="18" charset="0"/>
               </a:rPr>
               <a:t> </a:t>
             </a:r>
             <a:r>
-              <a:rPr lang="pt-BR" sz="3200" b="1" dirty="0" err="1">
+              <a:rPr lang="pt-BR" sz="2400" b="1" dirty="0" err="1">
                 <a:latin typeface="Times New Roman" panose="02020603050405020304" pitchFamily="18" charset="0"/>
                 <a:cs typeface="Times New Roman" panose="02020603050405020304" pitchFamily="18" charset="0"/>
               </a:rPr>
               <a:t>remote</a:t>
             </a:r>
             <a:r>
-              <a:rPr lang="pt-BR" sz="3200" b="1" dirty="0">
+              <a:rPr lang="pt-BR" sz="2400" b="1" dirty="0">
                 <a:latin typeface="Times New Roman" panose="02020603050405020304" pitchFamily="18" charset="0"/>
                 <a:cs typeface="Times New Roman" panose="02020603050405020304" pitchFamily="18" charset="0"/>
               </a:rPr>
               <a:t> </a:t>
             </a:r>
             <a:r>
-              <a:rPr lang="pt-BR" sz="3200" b="1" dirty="0" err="1">
+              <a:rPr lang="pt-BR" sz="2400" b="1" dirty="0" err="1">
                 <a:latin typeface="Times New Roman" panose="02020603050405020304" pitchFamily="18" charset="0"/>
                 <a:cs typeface="Times New Roman" panose="02020603050405020304" pitchFamily="18" charset="0"/>
               </a:rPr>
               <a:t>add</a:t>
             </a:r>
             <a:r>
-              <a:rPr lang="pt-BR" sz="3200" b="1" dirty="0">
+              <a:rPr lang="pt-BR" sz="2400" b="1" dirty="0">
                 <a:latin typeface="Times New Roman" panose="02020603050405020304" pitchFamily="18" charset="0"/>
                 <a:cs typeface="Times New Roman" panose="02020603050405020304" pitchFamily="18" charset="0"/>
               </a:rPr>
               <a:t> </a:t>
             </a:r>
             <a:r>
-              <a:rPr lang="pt-BR" sz="3200" b="1" dirty="0" err="1">
+              <a:rPr lang="pt-BR" sz="2400" b="1" dirty="0" err="1">
                 <a:latin typeface="Times New Roman" panose="02020603050405020304" pitchFamily="18" charset="0"/>
                 <a:cs typeface="Times New Roman" panose="02020603050405020304" pitchFamily="18" charset="0"/>
               </a:rPr>
               <a:t>origin</a:t>
             </a:r>
             <a:r>
-              <a:rPr lang="pt-BR" sz="3200" b="1" dirty="0">
+              <a:rPr lang="pt-BR" sz="2400" b="1" dirty="0">
                 <a:latin typeface="Times New Roman" panose="02020603050405020304" pitchFamily="18" charset="0"/>
                 <a:cs typeface="Times New Roman" panose="02020603050405020304" pitchFamily="18" charset="0"/>
               </a:rPr>
@@ -8754,14 +8754,14 @@
               <a:buNone/>
             </a:pPr>
             <a:r>
-              <a:rPr lang="pt-BR" sz="3200" b="1" dirty="0">
+              <a:rPr lang="pt-BR" sz="2400" b="1" dirty="0">
                 <a:latin typeface="Times New Roman" panose="02020603050405020304" pitchFamily="18" charset="0"/>
                 <a:cs typeface="Times New Roman" panose="02020603050405020304" pitchFamily="18" charset="0"/>
               </a:rPr>
               <a:t>https://github.com/CloudEducationBrazil/PROJETOWEB.git</a:t>
             </a:r>
             <a:r>
-              <a:rPr lang="pt-BR" sz="3200" dirty="0">
+              <a:rPr lang="pt-BR" sz="2400" dirty="0">
                 <a:latin typeface="Times New Roman" panose="02020603050405020304" pitchFamily="18" charset="0"/>
                 <a:cs typeface="Times New Roman" panose="02020603050405020304" pitchFamily="18" charset="0"/>
               </a:rPr>
@@ -8772,7 +8772,7 @@
             <a:pPr marL="0" indent="0" algn="just">
               <a:buNone/>
             </a:pPr>
-            <a:endParaRPr lang="pt-BR" sz="3200" dirty="0">
+            <a:endParaRPr lang="pt-BR" sz="2400" dirty="0">
               <a:latin typeface="Times New Roman" panose="02020603050405020304" pitchFamily="18" charset="0"/>
               <a:cs typeface="Times New Roman" panose="02020603050405020304" pitchFamily="18" charset="0"/>
             </a:endParaRPr>
@@ -8782,14 +8782,14 @@
               <a:buNone/>
             </a:pPr>
             <a:r>
-              <a:rPr lang="pt-BR" sz="3200" dirty="0">
-                <a:latin typeface="Times New Roman" panose="02020603050405020304" pitchFamily="18" charset="0"/>
-                <a:cs typeface="Times New Roman" panose="02020603050405020304" pitchFamily="18" charset="0"/>
-              </a:rPr>
-              <a:t>12. </a:t>
-            </a:r>
-            <a:r>
-              <a:rPr lang="pt-BR" sz="3200" b="1" dirty="0" err="1">
+              <a:rPr lang="pt-BR" sz="2400" dirty="0">
+                <a:latin typeface="Times New Roman" panose="02020603050405020304" pitchFamily="18" charset="0"/>
+                <a:cs typeface="Times New Roman" panose="02020603050405020304" pitchFamily="18" charset="0"/>
+              </a:rPr>
+              <a:t>16. </a:t>
+            </a:r>
+            <a:r>
+              <a:rPr lang="pt-BR" sz="2400" b="1" dirty="0" err="1">
                 <a:solidFill>
                   <a:srgbClr val="FF0000"/>
                 </a:solidFill>
@@ -8799,7 +8799,7 @@
               <a:t>git</a:t>
             </a:r>
             <a:r>
-              <a:rPr lang="pt-BR" sz="3200" b="1" dirty="0">
+              <a:rPr lang="pt-BR" sz="2400" b="1" dirty="0">
                 <a:solidFill>
                   <a:srgbClr val="FF0000"/>
                 </a:solidFill>
@@ -8809,7 +8809,7 @@
               <a:t> </a:t>
             </a:r>
             <a:r>
-              <a:rPr lang="pt-BR" sz="3200" b="1" dirty="0" err="1">
+              <a:rPr lang="pt-BR" sz="2400" b="1" dirty="0" err="1">
                 <a:solidFill>
                   <a:srgbClr val="FF0000"/>
                 </a:solidFill>
@@ -8819,7 +8819,7 @@
               <a:t>push</a:t>
             </a:r>
             <a:r>
-              <a:rPr lang="pt-BR" sz="3200" b="1" dirty="0">
+              <a:rPr lang="pt-BR" sz="2400" b="1" dirty="0">
                 <a:solidFill>
                   <a:srgbClr val="FF0000"/>
                 </a:solidFill>
@@ -8829,7 +8829,7 @@
               <a:t> -u </a:t>
             </a:r>
             <a:r>
-              <a:rPr lang="pt-BR" sz="3200" b="1" dirty="0" err="1">
+              <a:rPr lang="pt-BR" sz="2400" b="1" dirty="0" err="1">
                 <a:solidFill>
                   <a:srgbClr val="FF0000"/>
                 </a:solidFill>
@@ -8839,7 +8839,7 @@
               <a:t>origin</a:t>
             </a:r>
             <a:r>
-              <a:rPr lang="pt-BR" sz="3200" b="1" dirty="0">
+              <a:rPr lang="pt-BR" sz="2400" b="1" dirty="0">
                 <a:solidFill>
                   <a:srgbClr val="FF0000"/>
                 </a:solidFill>
@@ -8853,7 +8853,7 @@
             <a:pPr marL="0" indent="0" algn="just">
               <a:buNone/>
             </a:pPr>
-            <a:endParaRPr lang="pt-BR" sz="3200" b="1" dirty="0">
+            <a:endParaRPr lang="pt-BR" sz="2400" b="1" dirty="0">
               <a:solidFill>
                 <a:srgbClr val="FF0000"/>
               </a:solidFill>
@@ -8866,27 +8866,61 @@
               <a:buNone/>
             </a:pPr>
             <a:r>
-              <a:rPr lang="pt-BR" sz="1600" b="1" dirty="0">
+              <a:rPr lang="pt-BR" sz="2000" b="1" dirty="0">
                 <a:solidFill>
                   <a:srgbClr val="FF0000"/>
                 </a:solidFill>
                 <a:latin typeface="Times New Roman" panose="02020603050405020304" pitchFamily="18" charset="0"/>
                 <a:cs typeface="Times New Roman" panose="02020603050405020304" pitchFamily="18" charset="0"/>
               </a:rPr>
-              <a:t>Nota: </a:t>
-            </a:r>
-            <a:r>
-              <a:rPr lang="pt-BR" sz="1600" b="1" dirty="0">
-                <a:solidFill>
-                  <a:schemeClr val="tx1"/>
-                </a:solidFill>
-                <a:latin typeface="Times New Roman" panose="02020603050405020304" pitchFamily="18" charset="0"/>
-                <a:cs typeface="Times New Roman" panose="02020603050405020304" pitchFamily="18" charset="0"/>
-              </a:rPr>
-              <a:t>O </a:t>
-            </a:r>
-            <a:r>
-              <a:rPr lang="pt-BR" sz="1600" b="1" dirty="0" err="1">
+              <a:t>Atenção</a:t>
+            </a:r>
+            <a:r>
+              <a:rPr lang="pt-BR" sz="2000" dirty="0">
+                <a:latin typeface="Times New Roman" panose="02020603050405020304" pitchFamily="18" charset="0"/>
+                <a:cs typeface="Times New Roman" panose="02020603050405020304" pitchFamily="18" charset="0"/>
+              </a:rPr>
+              <a:t>: </a:t>
+            </a:r>
+            <a:r>
+              <a:rPr lang="pt-BR" sz="2000" b="1" dirty="0">
+                <a:solidFill>
+                  <a:srgbClr val="0070C0"/>
+                </a:solidFill>
+                <a:latin typeface="Times New Roman" panose="02020603050405020304" pitchFamily="18" charset="0"/>
+                <a:cs typeface="Times New Roman" panose="02020603050405020304" pitchFamily="18" charset="0"/>
+              </a:rPr>
+              <a:t>master ou </a:t>
+            </a:r>
+            <a:r>
+              <a:rPr lang="pt-BR" sz="2000" b="1" dirty="0" err="1">
+                <a:solidFill>
+                  <a:srgbClr val="0070C0"/>
+                </a:solidFill>
+                <a:latin typeface="Times New Roman" panose="02020603050405020304" pitchFamily="18" charset="0"/>
+                <a:cs typeface="Times New Roman" panose="02020603050405020304" pitchFamily="18" charset="0"/>
+              </a:rPr>
+              <a:t>main</a:t>
+            </a:r>
+            <a:r>
+              <a:rPr lang="pt-BR" sz="2000" b="1" dirty="0">
+                <a:solidFill>
+                  <a:srgbClr val="0070C0"/>
+                </a:solidFill>
+                <a:latin typeface="Times New Roman" panose="02020603050405020304" pitchFamily="18" charset="0"/>
+                <a:cs typeface="Times New Roman" panose="02020603050405020304" pitchFamily="18" charset="0"/>
+              </a:rPr>
+              <a:t>, </a:t>
+            </a:r>
+            <a:r>
+              <a:rPr lang="pt-BR" sz="2000" dirty="0">
+                <a:latin typeface="Times New Roman" panose="02020603050405020304" pitchFamily="18" charset="0"/>
+                <a:cs typeface="Times New Roman" panose="02020603050405020304" pitchFamily="18" charset="0"/>
+              </a:rPr>
+              <a:t>aonde será executado o, </a:t>
+            </a:r>
+            <a:r>
+              <a:rPr lang="pt-BR" sz="2000" b="1" dirty="0" err="1">
                 <a:solidFill>
                   <a:srgbClr val="FF0000"/>
                 </a:solidFill>
@@ -8896,7 +8930,7 @@
               <a:t>git</a:t>
             </a:r>
             <a:r>
-              <a:rPr lang="pt-BR" sz="1600" b="1" dirty="0">
+              <a:rPr lang="pt-BR" sz="2000" b="1" dirty="0">
                 <a:solidFill>
                   <a:srgbClr val="FF0000"/>
                 </a:solidFill>
@@ -8906,7 +8940,7 @@
               <a:t> </a:t>
             </a:r>
             <a:r>
-              <a:rPr lang="pt-BR" sz="1600" b="1" dirty="0" err="1">
+              <a:rPr lang="pt-BR" sz="2000" b="1" dirty="0" err="1">
                 <a:solidFill>
                   <a:srgbClr val="FF0000"/>
                 </a:solidFill>
@@ -8916,75 +8950,165 @@
               <a:t>push</a:t>
             </a:r>
             <a:r>
-              <a:rPr lang="pt-BR" sz="1600" b="1" dirty="0">
-                <a:solidFill>
-                  <a:schemeClr val="tx1"/>
-                </a:solidFill>
-                <a:latin typeface="Times New Roman" panose="02020603050405020304" pitchFamily="18" charset="0"/>
-                <a:cs typeface="Times New Roman" panose="02020603050405020304" pitchFamily="18" charset="0"/>
-              </a:rPr>
-              <a:t> pode ser na </a:t>
-            </a:r>
-            <a:r>
-              <a:rPr lang="pt-BR" sz="1600" b="1" dirty="0" err="1">
-                <a:solidFill>
-                  <a:schemeClr val="tx1"/>
-                </a:solidFill>
-                <a:latin typeface="Times New Roman" panose="02020603050405020304" pitchFamily="18" charset="0"/>
-                <a:cs typeface="Times New Roman" panose="02020603050405020304" pitchFamily="18" charset="0"/>
-              </a:rPr>
-              <a:t>branch</a:t>
-            </a:r>
-            <a:r>
-              <a:rPr lang="pt-BR" sz="1600" b="1" dirty="0">
-                <a:solidFill>
-                  <a:schemeClr val="tx1"/>
-                </a:solidFill>
+              <a:rPr lang="pt-BR" sz="2000" b="1" dirty="0">
+                <a:solidFill>
+                  <a:srgbClr val="FF0000"/>
+                </a:solidFill>
+                <a:latin typeface="Times New Roman" panose="02020603050405020304" pitchFamily="18" charset="0"/>
+                <a:cs typeface="Times New Roman" panose="02020603050405020304" pitchFamily="18" charset="0"/>
+              </a:rPr>
+              <a:t> –u </a:t>
+            </a:r>
+            <a:r>
+              <a:rPr lang="pt-BR" sz="2000" b="1" dirty="0" err="1">
+                <a:solidFill>
+                  <a:srgbClr val="FF0000"/>
+                </a:solidFill>
+                <a:latin typeface="Times New Roman" panose="02020603050405020304" pitchFamily="18" charset="0"/>
+                <a:cs typeface="Times New Roman" panose="02020603050405020304" pitchFamily="18" charset="0"/>
+              </a:rPr>
+              <a:t>origin</a:t>
+            </a:r>
+            <a:r>
+              <a:rPr lang="pt-BR" sz="2000" b="1" dirty="0">
+                <a:solidFill>
+                  <a:srgbClr val="FF0000"/>
+                </a:solidFill>
+                <a:latin typeface="Times New Roman" panose="02020603050405020304" pitchFamily="18" charset="0"/>
+                <a:cs typeface="Times New Roman" panose="02020603050405020304" pitchFamily="18" charset="0"/>
+              </a:rPr>
+              <a:t> ???</a:t>
+            </a:r>
+            <a:r>
+              <a:rPr lang="pt-BR" sz="2000" dirty="0">
+                <a:latin typeface="Times New Roman" panose="02020603050405020304" pitchFamily="18" charset="0"/>
+                <a:cs typeface="Times New Roman" panose="02020603050405020304" pitchFamily="18" charset="0"/>
+              </a:rPr>
+              <a:t>.</a:t>
+            </a:r>
+          </a:p>
+          <a:p>
+            <a:pPr marL="0" indent="0" algn="just">
+              <a:buNone/>
+            </a:pPr>
+            <a:r>
+              <a:rPr lang="pt-BR" sz="2000" b="1" dirty="0">
+                <a:solidFill>
+                  <a:srgbClr val="FF0000"/>
+                </a:solidFill>
+                <a:latin typeface="Times New Roman" panose="02020603050405020304" pitchFamily="18" charset="0"/>
+                <a:cs typeface="Times New Roman" panose="02020603050405020304" pitchFamily="18" charset="0"/>
+              </a:rPr>
+              <a:t>		 digitar no google: </a:t>
+            </a:r>
+            <a:r>
+              <a:rPr lang="pt-BR" sz="2000" dirty="0" err="1">
+                <a:latin typeface="Times New Roman" panose="02020603050405020304" pitchFamily="18" charset="0"/>
+                <a:cs typeface="Times New Roman" panose="02020603050405020304" pitchFamily="18" charset="0"/>
+              </a:rPr>
+              <a:t>github</a:t>
+            </a:r>
+            <a:r>
+              <a:rPr lang="pt-BR" sz="2000" dirty="0">
                 <a:latin typeface="Times New Roman" panose="02020603050405020304" pitchFamily="18" charset="0"/>
                 <a:cs typeface="Times New Roman" panose="02020603050405020304" pitchFamily="18" charset="0"/>
               </a:rPr>
               <a:t> </a:t>
             </a:r>
             <a:r>
-              <a:rPr lang="pt-BR" sz="1600" b="1" dirty="0" err="1">
-                <a:solidFill>
-                  <a:srgbClr val="FF0000"/>
-                </a:solidFill>
-                <a:latin typeface="Times New Roman" panose="02020603050405020304" pitchFamily="18" charset="0"/>
-                <a:cs typeface="Times New Roman" panose="02020603050405020304" pitchFamily="18" charset="0"/>
-              </a:rPr>
-              <a:t>main</a:t>
-            </a:r>
-            <a:r>
-              <a:rPr lang="pt-BR" sz="1600" b="1" dirty="0">
-                <a:solidFill>
-                  <a:schemeClr val="tx1"/>
-                </a:solidFill>
-                <a:latin typeface="Times New Roman" panose="02020603050405020304" pitchFamily="18" charset="0"/>
-                <a:cs typeface="Times New Roman" panose="02020603050405020304" pitchFamily="18" charset="0"/>
-              </a:rPr>
-              <a:t> ou </a:t>
-            </a:r>
-            <a:r>
-              <a:rPr lang="pt-BR" sz="1600" b="1" dirty="0">
-                <a:solidFill>
-                  <a:srgbClr val="FF0000"/>
-                </a:solidFill>
-                <a:latin typeface="Times New Roman" panose="02020603050405020304" pitchFamily="18" charset="0"/>
-                <a:cs typeface="Times New Roman" panose="02020603050405020304" pitchFamily="18" charset="0"/>
-              </a:rPr>
-              <a:t>master</a:t>
-            </a:r>
-            <a:r>
-              <a:rPr lang="pt-BR" sz="1600" b="1" dirty="0">
-                <a:solidFill>
-                  <a:schemeClr val="tx1"/>
-                </a:solidFill>
-                <a:latin typeface="Times New Roman" panose="02020603050405020304" pitchFamily="18" charset="0"/>
-                <a:cs typeface="Times New Roman" panose="02020603050405020304" pitchFamily="18" charset="0"/>
-              </a:rPr>
-              <a:t>, observar o gerado pelo GITHUB.</a:t>
-            </a:r>
+              <a:rPr lang="pt-BR" sz="2000" dirty="0" err="1">
+                <a:latin typeface="Times New Roman" panose="02020603050405020304" pitchFamily="18" charset="0"/>
+                <a:cs typeface="Times New Roman" panose="02020603050405020304" pitchFamily="18" charset="0"/>
+              </a:rPr>
+              <a:t>ssh</a:t>
+            </a:r>
+            <a:r>
+              <a:rPr lang="pt-BR" sz="2000" dirty="0">
+                <a:latin typeface="Times New Roman" panose="02020603050405020304" pitchFamily="18" charset="0"/>
+                <a:cs typeface="Times New Roman" panose="02020603050405020304" pitchFamily="18" charset="0"/>
+              </a:rPr>
+              <a:t>. </a:t>
+            </a:r>
+          </a:p>
+          <a:p>
+            <a:pPr marL="0" indent="0" algn="just">
+              <a:buNone/>
+            </a:pPr>
+            <a:r>
+              <a:rPr lang="pt-BR" sz="2000" b="1" dirty="0">
+                <a:latin typeface="Times New Roman" panose="02020603050405020304" pitchFamily="18" charset="0"/>
+                <a:cs typeface="Times New Roman" panose="02020603050405020304" pitchFamily="18" charset="0"/>
+              </a:rPr>
+              <a:t>Deve ser gerado</a:t>
+            </a:r>
+            <a:r>
+              <a:rPr lang="pt-BR" sz="2000" dirty="0">
+                <a:latin typeface="Times New Roman" panose="02020603050405020304" pitchFamily="18" charset="0"/>
+                <a:cs typeface="Times New Roman" panose="02020603050405020304" pitchFamily="18" charset="0"/>
+              </a:rPr>
+              <a:t>: a) uma </a:t>
+            </a:r>
+            <a:r>
+              <a:rPr lang="pt-BR" sz="2000" b="1" dirty="0">
+                <a:latin typeface="Times New Roman" panose="02020603050405020304" pitchFamily="18" charset="0"/>
+                <a:cs typeface="Times New Roman" panose="02020603050405020304" pitchFamily="18" charset="0"/>
+              </a:rPr>
+              <a:t>chave SSH </a:t>
+            </a:r>
+            <a:r>
+              <a:rPr lang="pt-BR" sz="2000" dirty="0">
+                <a:latin typeface="Times New Roman" panose="02020603050405020304" pitchFamily="18" charset="0"/>
+                <a:cs typeface="Times New Roman" panose="02020603050405020304" pitchFamily="18" charset="0"/>
+              </a:rPr>
+              <a:t>no seu computador, </a:t>
+            </a:r>
+          </a:p>
+          <a:p>
+            <a:pPr marL="0" indent="0" algn="just">
+              <a:buNone/>
+            </a:pPr>
+            <a:r>
+              <a:rPr lang="pt-BR" sz="2000" dirty="0">
+                <a:latin typeface="Times New Roman" panose="02020603050405020304" pitchFamily="18" charset="0"/>
+                <a:cs typeface="Times New Roman" panose="02020603050405020304" pitchFamily="18" charset="0"/>
+              </a:rPr>
+              <a:t>                             b) cadastrar essa </a:t>
+            </a:r>
+            <a:r>
+              <a:rPr lang="pt-BR" sz="2000" b="1" dirty="0">
+                <a:latin typeface="Times New Roman" panose="02020603050405020304" pitchFamily="18" charset="0"/>
+                <a:cs typeface="Times New Roman" panose="02020603050405020304" pitchFamily="18" charset="0"/>
+              </a:rPr>
+              <a:t>chave SSH</a:t>
+            </a:r>
+            <a:r>
+              <a:rPr lang="pt-BR" sz="2000" dirty="0">
+                <a:latin typeface="Times New Roman" panose="02020603050405020304" pitchFamily="18" charset="0"/>
+                <a:cs typeface="Times New Roman" panose="02020603050405020304" pitchFamily="18" charset="0"/>
+              </a:rPr>
+              <a:t> no seu </a:t>
+            </a:r>
+            <a:r>
+              <a:rPr lang="pt-BR" sz="2000" dirty="0" err="1">
+                <a:latin typeface="Times New Roman" panose="02020603050405020304" pitchFamily="18" charset="0"/>
+                <a:cs typeface="Times New Roman" panose="02020603050405020304" pitchFamily="18" charset="0"/>
+              </a:rPr>
+              <a:t>Github</a:t>
+            </a:r>
+            <a:r>
+              <a:rPr lang="pt-BR" sz="2000" dirty="0">
+                <a:latin typeface="Times New Roman" panose="02020603050405020304" pitchFamily="18" charset="0"/>
+                <a:cs typeface="Times New Roman" panose="02020603050405020304" pitchFamily="18" charset="0"/>
+              </a:rPr>
+              <a:t>.</a:t>
+            </a:r>
+            <a:endParaRPr lang="pt-BR" sz="2000" b="1" dirty="0">
+              <a:solidFill>
+                <a:srgbClr val="FF0000"/>
+              </a:solidFill>
+              <a:latin typeface="Times New Roman" panose="02020603050405020304" pitchFamily="18" charset="0"/>
+              <a:cs typeface="Times New Roman" panose="02020603050405020304" pitchFamily="18" charset="0"/>
+            </a:endParaRPr>
           </a:p>
         </p:txBody>
       </p:sp>
@@ -25652,11 +25776,11 @@
               <a:t>2. </a:t>
             </a:r>
             <a:r>
-              <a:rPr lang="pt-BR" sz="3200" b="1" dirty="0">
-                <a:latin typeface="Times New Roman" panose="02020603050405020304" pitchFamily="18" charset="0"/>
-                <a:cs typeface="Times New Roman" panose="02020603050405020304" pitchFamily="18" charset="0"/>
-              </a:rPr>
-              <a:t>LOGAR</a:t>
+              <a:rPr lang="pt-BR" sz="3200" b="1" dirty="0" err="1">
+                <a:latin typeface="Times New Roman" panose="02020603050405020304" pitchFamily="18" charset="0"/>
+                <a:cs typeface="Times New Roman" panose="02020603050405020304" pitchFamily="18" charset="0"/>
+              </a:rPr>
+              <a:t>Logar</a:t>
             </a:r>
             <a:r>
               <a:rPr lang="pt-BR" sz="3200" dirty="0">

</xml_diff>

<commit_message>
Slide Aula com Token
</commit_message>
<xml_diff>
--- a/01 Classes/Aula 02, 03, 04 Desenvolvimento Web Caracterização - HTML.pptx
+++ b/01 Classes/Aula 02, 03, 04 Desenvolvimento Web Caracterização - HTML.pptx
@@ -8686,63 +8686,63 @@
               <a:buNone/>
             </a:pPr>
             <a:r>
-              <a:rPr lang="pt-BR" sz="2400" dirty="0">
+              <a:rPr lang="pt-BR" sz="2000" dirty="0">
                 <a:latin typeface="Times New Roman" panose="02020603050405020304" pitchFamily="18" charset="0"/>
                 <a:cs typeface="Times New Roman" panose="02020603050405020304" pitchFamily="18" charset="0"/>
               </a:rPr>
               <a:t>15. </a:t>
             </a:r>
             <a:r>
-              <a:rPr lang="pt-BR" sz="2400" b="1" dirty="0" err="1">
+              <a:rPr lang="pt-BR" sz="2000" b="1" dirty="0" err="1">
                 <a:latin typeface="Times New Roman" panose="02020603050405020304" pitchFamily="18" charset="0"/>
                 <a:cs typeface="Times New Roman" panose="02020603050405020304" pitchFamily="18" charset="0"/>
               </a:rPr>
               <a:t>git</a:t>
             </a:r>
             <a:r>
-              <a:rPr lang="pt-BR" sz="2400" b="1" dirty="0">
+              <a:rPr lang="pt-BR" sz="2000" b="1" dirty="0">
                 <a:latin typeface="Times New Roman" panose="02020603050405020304" pitchFamily="18" charset="0"/>
                 <a:cs typeface="Times New Roman" panose="02020603050405020304" pitchFamily="18" charset="0"/>
               </a:rPr>
               <a:t> </a:t>
             </a:r>
             <a:r>
-              <a:rPr lang="pt-BR" sz="2400" b="1" dirty="0" err="1">
+              <a:rPr lang="pt-BR" sz="2000" b="1" dirty="0" err="1">
                 <a:latin typeface="Times New Roman" panose="02020603050405020304" pitchFamily="18" charset="0"/>
                 <a:cs typeface="Times New Roman" panose="02020603050405020304" pitchFamily="18" charset="0"/>
               </a:rPr>
               <a:t>remote</a:t>
             </a:r>
             <a:r>
-              <a:rPr lang="pt-BR" sz="2400" b="1" dirty="0">
+              <a:rPr lang="pt-BR" sz="2000" b="1" dirty="0">
                 <a:latin typeface="Times New Roman" panose="02020603050405020304" pitchFamily="18" charset="0"/>
                 <a:cs typeface="Times New Roman" panose="02020603050405020304" pitchFamily="18" charset="0"/>
               </a:rPr>
               <a:t> </a:t>
             </a:r>
             <a:r>
-              <a:rPr lang="pt-BR" sz="2400" b="1" dirty="0" err="1">
+              <a:rPr lang="pt-BR" sz="2000" b="1" dirty="0" err="1">
                 <a:latin typeface="Times New Roman" panose="02020603050405020304" pitchFamily="18" charset="0"/>
                 <a:cs typeface="Times New Roman" panose="02020603050405020304" pitchFamily="18" charset="0"/>
               </a:rPr>
               <a:t>add</a:t>
             </a:r>
             <a:r>
-              <a:rPr lang="pt-BR" sz="2400" b="1" dirty="0">
+              <a:rPr lang="pt-BR" sz="2000" b="1" dirty="0">
                 <a:latin typeface="Times New Roman" panose="02020603050405020304" pitchFamily="18" charset="0"/>
                 <a:cs typeface="Times New Roman" panose="02020603050405020304" pitchFamily="18" charset="0"/>
               </a:rPr>
               <a:t> </a:t>
             </a:r>
             <a:r>
-              <a:rPr lang="pt-BR" sz="2400" b="1" dirty="0" err="1">
+              <a:rPr lang="pt-BR" sz="2000" b="1" dirty="0" err="1">
                 <a:latin typeface="Times New Roman" panose="02020603050405020304" pitchFamily="18" charset="0"/>
                 <a:cs typeface="Times New Roman" panose="02020603050405020304" pitchFamily="18" charset="0"/>
               </a:rPr>
               <a:t>origin</a:t>
             </a:r>
             <a:r>
-              <a:rPr lang="pt-BR" sz="2400" b="1" dirty="0">
+              <a:rPr lang="pt-BR" sz="2000" b="1" dirty="0">
                 <a:latin typeface="Times New Roman" panose="02020603050405020304" pitchFamily="18" charset="0"/>
                 <a:cs typeface="Times New Roman" panose="02020603050405020304" pitchFamily="18" charset="0"/>
               </a:rPr>
@@ -8754,14 +8754,14 @@
               <a:buNone/>
             </a:pPr>
             <a:r>
-              <a:rPr lang="pt-BR" sz="2400" b="1" dirty="0">
+              <a:rPr lang="pt-BR" sz="2000" b="1" dirty="0">
                 <a:latin typeface="Times New Roman" panose="02020603050405020304" pitchFamily="18" charset="0"/>
                 <a:cs typeface="Times New Roman" panose="02020603050405020304" pitchFamily="18" charset="0"/>
               </a:rPr>
               <a:t>https://github.com/CloudEducationBrazil/PROJETOWEB.git</a:t>
             </a:r>
             <a:r>
-              <a:rPr lang="pt-BR" sz="2400" dirty="0">
+              <a:rPr lang="pt-BR" sz="2000" dirty="0">
                 <a:latin typeface="Times New Roman" panose="02020603050405020304" pitchFamily="18" charset="0"/>
                 <a:cs typeface="Times New Roman" panose="02020603050405020304" pitchFamily="18" charset="0"/>
               </a:rPr>
@@ -8772,7 +8772,7 @@
             <a:pPr marL="0" indent="0" algn="just">
               <a:buNone/>
             </a:pPr>
-            <a:endParaRPr lang="pt-BR" sz="2400" dirty="0">
+            <a:endParaRPr lang="pt-BR" sz="2000" dirty="0">
               <a:latin typeface="Times New Roman" panose="02020603050405020304" pitchFamily="18" charset="0"/>
               <a:cs typeface="Times New Roman" panose="02020603050405020304" pitchFamily="18" charset="0"/>
             </a:endParaRPr>
@@ -8782,14 +8782,14 @@
               <a:buNone/>
             </a:pPr>
             <a:r>
-              <a:rPr lang="pt-BR" sz="2400" dirty="0">
+              <a:rPr lang="pt-BR" sz="2000" dirty="0">
                 <a:latin typeface="Times New Roman" panose="02020603050405020304" pitchFamily="18" charset="0"/>
                 <a:cs typeface="Times New Roman" panose="02020603050405020304" pitchFamily="18" charset="0"/>
               </a:rPr>
               <a:t>16. </a:t>
             </a:r>
             <a:r>
-              <a:rPr lang="pt-BR" sz="2400" b="1" dirty="0" err="1">
+              <a:rPr lang="pt-BR" sz="2000" b="1" dirty="0" err="1">
                 <a:solidFill>
                   <a:srgbClr val="FF0000"/>
                 </a:solidFill>
@@ -8799,7 +8799,7 @@
               <a:t>git</a:t>
             </a:r>
             <a:r>
-              <a:rPr lang="pt-BR" sz="2400" b="1" dirty="0">
+              <a:rPr lang="pt-BR" sz="2000" b="1" dirty="0">
                 <a:solidFill>
                   <a:srgbClr val="FF0000"/>
                 </a:solidFill>
@@ -8809,7 +8809,7 @@
               <a:t> </a:t>
             </a:r>
             <a:r>
-              <a:rPr lang="pt-BR" sz="2400" b="1" dirty="0" err="1">
+              <a:rPr lang="pt-BR" sz="2000" b="1" dirty="0" err="1">
                 <a:solidFill>
                   <a:srgbClr val="FF0000"/>
                 </a:solidFill>
@@ -8819,7 +8819,7 @@
               <a:t>push</a:t>
             </a:r>
             <a:r>
-              <a:rPr lang="pt-BR" sz="2400" b="1" dirty="0">
+              <a:rPr lang="pt-BR" sz="2000" b="1" dirty="0">
                 <a:solidFill>
                   <a:srgbClr val="FF0000"/>
                 </a:solidFill>
@@ -8829,7 +8829,7 @@
               <a:t> -u </a:t>
             </a:r>
             <a:r>
-              <a:rPr lang="pt-BR" sz="2400" b="1" dirty="0" err="1">
+              <a:rPr lang="pt-BR" sz="2000" b="1" dirty="0" err="1">
                 <a:solidFill>
                   <a:srgbClr val="FF0000"/>
                 </a:solidFill>
@@ -8839,7 +8839,7 @@
               <a:t>origin</a:t>
             </a:r>
             <a:r>
-              <a:rPr lang="pt-BR" sz="2400" b="1" dirty="0">
+              <a:rPr lang="pt-BR" sz="2000" b="1" dirty="0">
                 <a:solidFill>
                   <a:srgbClr val="FF0000"/>
                 </a:solidFill>
@@ -8853,7 +8853,7 @@
             <a:pPr marL="0" indent="0" algn="just">
               <a:buNone/>
             </a:pPr>
-            <a:endParaRPr lang="pt-BR" sz="2400" b="1" dirty="0">
+            <a:endParaRPr lang="pt-BR" sz="2000" b="1" dirty="0">
               <a:solidFill>
                 <a:srgbClr val="FF0000"/>
               </a:solidFill>
@@ -8873,235 +8873,246 @@
                 <a:latin typeface="Times New Roman" panose="02020603050405020304" pitchFamily="18" charset="0"/>
                 <a:cs typeface="Times New Roman" panose="02020603050405020304" pitchFamily="18" charset="0"/>
               </a:rPr>
-              <a:t>Atenção</a:t>
-            </a:r>
+              <a:t>Digitar no google: </a:t>
+            </a:r>
+            <a:r>
+              <a:rPr lang="pt-BR" sz="2000" b="1" dirty="0" err="1">
+                <a:latin typeface="Times New Roman" panose="02020603050405020304" pitchFamily="18" charset="0"/>
+                <a:cs typeface="Times New Roman" panose="02020603050405020304" pitchFamily="18" charset="0"/>
+              </a:rPr>
+              <a:t>github</a:t>
+            </a:r>
+            <a:r>
+              <a:rPr lang="pt-BR" sz="2000" b="1" dirty="0">
+                <a:latin typeface="Times New Roman" panose="02020603050405020304" pitchFamily="18" charset="0"/>
+                <a:cs typeface="Times New Roman" panose="02020603050405020304" pitchFamily="18" charset="0"/>
+              </a:rPr>
+              <a:t> </a:t>
+            </a:r>
+            <a:r>
+              <a:rPr lang="pt-BR" sz="2000" b="1" dirty="0" err="1">
+                <a:latin typeface="Times New Roman" panose="02020603050405020304" pitchFamily="18" charset="0"/>
+                <a:cs typeface="Times New Roman" panose="02020603050405020304" pitchFamily="18" charset="0"/>
+              </a:rPr>
+              <a:t>ssh</a:t>
+            </a:r>
+            <a:r>
+              <a:rPr lang="pt-BR" sz="2000" b="1" dirty="0">
+                <a:latin typeface="Times New Roman" panose="02020603050405020304" pitchFamily="18" charset="0"/>
+                <a:cs typeface="Times New Roman" panose="02020603050405020304" pitchFamily="18" charset="0"/>
+              </a:rPr>
+              <a:t> </a:t>
+            </a:r>
+            <a:r>
+              <a:rPr lang="pt-BR" sz="2000" b="1" dirty="0">
+                <a:solidFill>
+                  <a:srgbClr val="FF0000"/>
+                </a:solidFill>
+                <a:latin typeface="Times New Roman" panose="02020603050405020304" pitchFamily="18" charset="0"/>
+                <a:cs typeface="Times New Roman" panose="02020603050405020304" pitchFamily="18" charset="0"/>
+              </a:rPr>
+              <a:t>(Pesquisar tema SSH) </a:t>
+            </a:r>
+            <a:r>
+              <a:rPr lang="pt-BR" sz="2000" b="1">
+                <a:solidFill>
+                  <a:srgbClr val="FF0000"/>
+                </a:solidFill>
+                <a:latin typeface="Times New Roman" panose="02020603050405020304" pitchFamily="18" charset="0"/>
+                <a:cs typeface="Times New Roman" panose="02020603050405020304" pitchFamily="18" charset="0"/>
+              </a:rPr>
+              <a:t>- Token</a:t>
+            </a:r>
+            <a:endParaRPr lang="pt-BR" sz="2000" dirty="0">
+              <a:solidFill>
+                <a:srgbClr val="FF0000"/>
+              </a:solidFill>
+              <a:latin typeface="Times New Roman" panose="02020603050405020304" pitchFamily="18" charset="0"/>
+              <a:cs typeface="Times New Roman" panose="02020603050405020304" pitchFamily="18" charset="0"/>
+            </a:endParaRPr>
+          </a:p>
+          <a:p>
+            <a:pPr marL="457200" indent="-457200" algn="just">
+              <a:buAutoNum type="alphaLcParenR"/>
+            </a:pPr>
             <a:r>
               <a:rPr lang="pt-BR" sz="2000" dirty="0">
                 <a:latin typeface="Times New Roman" panose="02020603050405020304" pitchFamily="18" charset="0"/>
                 <a:cs typeface="Times New Roman" panose="02020603050405020304" pitchFamily="18" charset="0"/>
               </a:rPr>
+              <a:t>gerar uma </a:t>
+            </a:r>
+            <a:r>
+              <a:rPr lang="pt-BR" sz="2000" b="1" dirty="0">
+                <a:latin typeface="Times New Roman" panose="02020603050405020304" pitchFamily="18" charset="0"/>
+                <a:cs typeface="Times New Roman" panose="02020603050405020304" pitchFamily="18" charset="0"/>
+              </a:rPr>
+              <a:t>chave SSH</a:t>
+            </a:r>
+            <a:r>
+              <a:rPr lang="pt-BR" sz="2000" dirty="0">
+                <a:latin typeface="Times New Roman" panose="02020603050405020304" pitchFamily="18" charset="0"/>
+                <a:cs typeface="Times New Roman" panose="02020603050405020304" pitchFamily="18" charset="0"/>
+              </a:rPr>
+              <a:t> no computador. b) cadastrar </a:t>
+            </a:r>
+            <a:r>
+              <a:rPr lang="pt-BR" sz="2000" b="1" dirty="0">
+                <a:latin typeface="Times New Roman" panose="02020603050405020304" pitchFamily="18" charset="0"/>
+                <a:cs typeface="Times New Roman" panose="02020603050405020304" pitchFamily="18" charset="0"/>
+              </a:rPr>
+              <a:t>chave SSH</a:t>
+            </a:r>
+            <a:r>
+              <a:rPr lang="pt-BR" sz="2000" dirty="0">
+                <a:latin typeface="Times New Roman" panose="02020603050405020304" pitchFamily="18" charset="0"/>
+                <a:cs typeface="Times New Roman" panose="02020603050405020304" pitchFamily="18" charset="0"/>
+              </a:rPr>
+              <a:t> no seu </a:t>
+            </a:r>
+            <a:r>
+              <a:rPr lang="pt-BR" sz="2000" dirty="0" err="1">
+                <a:latin typeface="Times New Roman" panose="02020603050405020304" pitchFamily="18" charset="0"/>
+                <a:cs typeface="Times New Roman" panose="02020603050405020304" pitchFamily="18" charset="0"/>
+              </a:rPr>
+              <a:t>Github</a:t>
+            </a:r>
+            <a:r>
+              <a:rPr lang="pt-BR" sz="2000" dirty="0">
+                <a:latin typeface="Times New Roman" panose="02020603050405020304" pitchFamily="18" charset="0"/>
+                <a:cs typeface="Times New Roman" panose="02020603050405020304" pitchFamily="18" charset="0"/>
+              </a:rPr>
+              <a:t>.</a:t>
+            </a:r>
+          </a:p>
+          <a:p>
+            <a:pPr marL="0" indent="0" algn="just">
+              <a:buNone/>
+            </a:pPr>
+            <a:r>
+              <a:rPr lang="pt-BR" sz="2000" b="1" dirty="0">
+                <a:solidFill>
+                  <a:srgbClr val="FF0000"/>
+                </a:solidFill>
+                <a:latin typeface="Times New Roman" panose="02020603050405020304" pitchFamily="18" charset="0"/>
+                <a:cs typeface="Times New Roman" panose="02020603050405020304" pitchFamily="18" charset="0"/>
+              </a:rPr>
+              <a:t>Gerenciador de Credenciais do Windows (</a:t>
+            </a:r>
+            <a:r>
+              <a:rPr lang="pt-BR" sz="2000" b="1" dirty="0">
+                <a:solidFill>
+                  <a:srgbClr val="0070C0"/>
+                </a:solidFill>
+                <a:latin typeface="Times New Roman" panose="02020603050405020304" pitchFamily="18" charset="0"/>
+                <a:cs typeface="Times New Roman" panose="02020603050405020304" pitchFamily="18" charset="0"/>
+              </a:rPr>
+              <a:t>Adicionar um credencial genérica</a:t>
+            </a:r>
+            <a:r>
+              <a:rPr lang="pt-BR" sz="2000" b="1" dirty="0">
+                <a:solidFill>
+                  <a:srgbClr val="FF0000"/>
+                </a:solidFill>
+                <a:latin typeface="Times New Roman" panose="02020603050405020304" pitchFamily="18" charset="0"/>
+                <a:cs typeface="Times New Roman" panose="02020603050405020304" pitchFamily="18" charset="0"/>
+              </a:rPr>
+              <a:t>)</a:t>
+            </a:r>
+          </a:p>
+          <a:p>
+            <a:pPr marL="457200" indent="-457200" algn="just">
+              <a:buAutoNum type="alphaLcParenR"/>
+            </a:pPr>
+            <a:r>
+              <a:rPr lang="pt-BR" sz="2000" dirty="0">
+                <a:latin typeface="Times New Roman" panose="02020603050405020304" pitchFamily="18" charset="0"/>
+                <a:cs typeface="Times New Roman" panose="02020603050405020304" pitchFamily="18" charset="0"/>
+              </a:rPr>
+              <a:t>(</a:t>
+            </a:r>
+            <a:r>
+              <a:rPr lang="pt-BR" sz="2000" b="1" dirty="0">
+                <a:latin typeface="Times New Roman" panose="02020603050405020304" pitchFamily="18" charset="0"/>
+                <a:cs typeface="Times New Roman" panose="02020603050405020304" pitchFamily="18" charset="0"/>
+              </a:rPr>
+              <a:t>Endereço rede</a:t>
+            </a:r>
+            <a:r>
+              <a:rPr lang="pt-BR" sz="2000" dirty="0">
+                <a:latin typeface="Times New Roman" panose="02020603050405020304" pitchFamily="18" charset="0"/>
+                <a:cs typeface="Times New Roman" panose="02020603050405020304" pitchFamily="18" charset="0"/>
+              </a:rPr>
               <a:t>: </a:t>
             </a:r>
             <a:r>
+              <a:rPr lang="pt-BR" sz="2000" dirty="0" err="1">
+                <a:latin typeface="Times New Roman" panose="02020603050405020304" pitchFamily="18" charset="0"/>
+                <a:cs typeface="Times New Roman" panose="02020603050405020304" pitchFamily="18" charset="0"/>
+              </a:rPr>
+              <a:t>git:https</a:t>
+            </a:r>
+            <a:r>
+              <a:rPr lang="pt-BR" sz="2000" dirty="0">
+                <a:latin typeface="Times New Roman" panose="02020603050405020304" pitchFamily="18" charset="0"/>
+                <a:cs typeface="Times New Roman" panose="02020603050405020304" pitchFamily="18" charset="0"/>
+              </a:rPr>
+              <a:t>://github.com); </a:t>
+            </a:r>
+            <a:r>
               <a:rPr lang="pt-BR" sz="2000" b="1" dirty="0">
-                <a:solidFill>
-                  <a:srgbClr val="0070C0"/>
-                </a:solidFill>
-                <a:latin typeface="Times New Roman" panose="02020603050405020304" pitchFamily="18" charset="0"/>
-                <a:cs typeface="Times New Roman" panose="02020603050405020304" pitchFamily="18" charset="0"/>
-              </a:rPr>
-              <a:t>master ou </a:t>
-            </a:r>
-            <a:r>
-              <a:rPr lang="pt-BR" sz="2000" b="1" dirty="0" err="1">
-                <a:solidFill>
-                  <a:srgbClr val="0070C0"/>
-                </a:solidFill>
-                <a:latin typeface="Times New Roman" panose="02020603050405020304" pitchFamily="18" charset="0"/>
-                <a:cs typeface="Times New Roman" panose="02020603050405020304" pitchFamily="18" charset="0"/>
-              </a:rPr>
-              <a:t>main</a:t>
+                <a:latin typeface="Times New Roman" panose="02020603050405020304" pitchFamily="18" charset="0"/>
+                <a:cs typeface="Times New Roman" panose="02020603050405020304" pitchFamily="18" charset="0"/>
+              </a:rPr>
+              <a:t>Usuário</a:t>
+            </a:r>
+            <a:r>
+              <a:rPr lang="pt-BR" sz="2000" dirty="0">
+                <a:latin typeface="Times New Roman" panose="02020603050405020304" pitchFamily="18" charset="0"/>
+                <a:cs typeface="Times New Roman" panose="02020603050405020304" pitchFamily="18" charset="0"/>
+              </a:rPr>
+              <a:t>: Conta </a:t>
+            </a:r>
+            <a:r>
+              <a:rPr lang="pt-BR" sz="2000" dirty="0" err="1">
+                <a:latin typeface="Times New Roman" panose="02020603050405020304" pitchFamily="18" charset="0"/>
+                <a:cs typeface="Times New Roman" panose="02020603050405020304" pitchFamily="18" charset="0"/>
+              </a:rPr>
+              <a:t>Github</a:t>
+            </a:r>
+            <a:r>
+              <a:rPr lang="pt-BR" sz="2000" dirty="0">
+                <a:latin typeface="Times New Roman" panose="02020603050405020304" pitchFamily="18" charset="0"/>
+                <a:cs typeface="Times New Roman" panose="02020603050405020304" pitchFamily="18" charset="0"/>
+              </a:rPr>
+              <a:t> </a:t>
             </a:r>
             <a:r>
               <a:rPr lang="pt-BR" sz="2000" b="1" dirty="0">
-                <a:solidFill>
-                  <a:srgbClr val="0070C0"/>
-                </a:solidFill>
-                <a:latin typeface="Times New Roman" panose="02020603050405020304" pitchFamily="18" charset="0"/>
-                <a:cs typeface="Times New Roman" panose="02020603050405020304" pitchFamily="18" charset="0"/>
-              </a:rPr>
-              <a:t>, </a:t>
+                <a:latin typeface="Times New Roman" panose="02020603050405020304" pitchFamily="18" charset="0"/>
+                <a:cs typeface="Times New Roman" panose="02020603050405020304" pitchFamily="18" charset="0"/>
+              </a:rPr>
+              <a:t>Senha</a:t>
             </a:r>
             <a:r>
               <a:rPr lang="pt-BR" sz="2000" dirty="0">
                 <a:latin typeface="Times New Roman" panose="02020603050405020304" pitchFamily="18" charset="0"/>
                 <a:cs typeface="Times New Roman" panose="02020603050405020304" pitchFamily="18" charset="0"/>
               </a:rPr>
-              <a:t>aonde será executado o, </a:t>
-            </a:r>
-            <a:r>
-              <a:rPr lang="pt-BR" sz="2000" b="1" dirty="0" err="1">
-                <a:solidFill>
-                  <a:srgbClr val="FF0000"/>
-                </a:solidFill>
-                <a:latin typeface="Times New Roman" panose="02020603050405020304" pitchFamily="18" charset="0"/>
-                <a:cs typeface="Times New Roman" panose="02020603050405020304" pitchFamily="18" charset="0"/>
-              </a:rPr>
-              <a:t>git</a:t>
-            </a:r>
-            <a:r>
-              <a:rPr lang="pt-BR" sz="2000" b="1" dirty="0">
-                <a:solidFill>
-                  <a:srgbClr val="FF0000"/>
-                </a:solidFill>
-                <a:latin typeface="Times New Roman" panose="02020603050405020304" pitchFamily="18" charset="0"/>
-                <a:cs typeface="Times New Roman" panose="02020603050405020304" pitchFamily="18" charset="0"/>
-              </a:rPr>
-              <a:t> </a:t>
-            </a:r>
-            <a:r>
-              <a:rPr lang="pt-BR" sz="2000" b="1" dirty="0" err="1">
-                <a:solidFill>
-                  <a:srgbClr val="FF0000"/>
-                </a:solidFill>
-                <a:latin typeface="Times New Roman" panose="02020603050405020304" pitchFamily="18" charset="0"/>
-                <a:cs typeface="Times New Roman" panose="02020603050405020304" pitchFamily="18" charset="0"/>
-              </a:rPr>
-              <a:t>push</a:t>
-            </a:r>
-            <a:r>
-              <a:rPr lang="pt-BR" sz="2000" b="1" dirty="0">
-                <a:solidFill>
-                  <a:srgbClr val="FF0000"/>
-                </a:solidFill>
-                <a:latin typeface="Times New Roman" panose="02020603050405020304" pitchFamily="18" charset="0"/>
-                <a:cs typeface="Times New Roman" panose="02020603050405020304" pitchFamily="18" charset="0"/>
-              </a:rPr>
-              <a:t> –u </a:t>
-            </a:r>
-            <a:r>
-              <a:rPr lang="pt-BR" sz="2000" b="1" dirty="0" err="1">
-                <a:solidFill>
-                  <a:srgbClr val="FF0000"/>
-                </a:solidFill>
-                <a:latin typeface="Times New Roman" panose="02020603050405020304" pitchFamily="18" charset="0"/>
-                <a:cs typeface="Times New Roman" panose="02020603050405020304" pitchFamily="18" charset="0"/>
-              </a:rPr>
-              <a:t>origin</a:t>
-            </a:r>
-            <a:r>
-              <a:rPr lang="pt-BR" sz="2000" b="1" dirty="0">
-                <a:solidFill>
-                  <a:srgbClr val="FF0000"/>
-                </a:solidFill>
-                <a:latin typeface="Times New Roman" panose="02020603050405020304" pitchFamily="18" charset="0"/>
-                <a:cs typeface="Times New Roman" panose="02020603050405020304" pitchFamily="18" charset="0"/>
-              </a:rPr>
-              <a:t> ???</a:t>
-            </a:r>
-            <a:r>
-              <a:rPr lang="pt-BR" sz="2000" dirty="0">
-                <a:latin typeface="Times New Roman" panose="02020603050405020304" pitchFamily="18" charset="0"/>
-                <a:cs typeface="Times New Roman" panose="02020603050405020304" pitchFamily="18" charset="0"/>
-              </a:rPr>
-              <a:t>.</a:t>
-            </a:r>
-          </a:p>
-          <a:p>
-            <a:pPr marL="0" indent="0" algn="just">
-              <a:buNone/>
-            </a:pPr>
-            <a:r>
-              <a:rPr lang="pt-BR" sz="2000" b="1" dirty="0">
-                <a:solidFill>
-                  <a:srgbClr val="FF0000"/>
-                </a:solidFill>
-                <a:latin typeface="Times New Roman" panose="02020603050405020304" pitchFamily="18" charset="0"/>
-                <a:cs typeface="Times New Roman" panose="02020603050405020304" pitchFamily="18" charset="0"/>
-              </a:rPr>
-              <a:t>		 digitar no google: </a:t>
-            </a:r>
-            <a:r>
-              <a:rPr lang="pt-BR" sz="2000" dirty="0" err="1">
-                <a:latin typeface="Times New Roman" panose="02020603050405020304" pitchFamily="18" charset="0"/>
-                <a:cs typeface="Times New Roman" panose="02020603050405020304" pitchFamily="18" charset="0"/>
-              </a:rPr>
-              <a:t>github</a:t>
-            </a:r>
-            <a:r>
-              <a:rPr lang="pt-BR" sz="2000" dirty="0">
-                <a:latin typeface="Times New Roman" panose="02020603050405020304" pitchFamily="18" charset="0"/>
-                <a:cs typeface="Times New Roman" panose="02020603050405020304" pitchFamily="18" charset="0"/>
-              </a:rPr>
-              <a:t> </a:t>
-            </a:r>
-            <a:r>
-              <a:rPr lang="pt-BR" sz="2000" dirty="0" err="1">
-                <a:latin typeface="Times New Roman" panose="02020603050405020304" pitchFamily="18" charset="0"/>
-                <a:cs typeface="Times New Roman" panose="02020603050405020304" pitchFamily="18" charset="0"/>
-              </a:rPr>
-              <a:t>ssh</a:t>
-            </a:r>
-            <a:r>
-              <a:rPr lang="pt-BR" sz="2000" dirty="0">
-                <a:latin typeface="Times New Roman" panose="02020603050405020304" pitchFamily="18" charset="0"/>
-                <a:cs typeface="Times New Roman" panose="02020603050405020304" pitchFamily="18" charset="0"/>
-              </a:rPr>
-              <a:t>. </a:t>
-            </a:r>
-          </a:p>
-          <a:p>
-            <a:pPr marL="0" indent="0" algn="just">
-              <a:buNone/>
-            </a:pPr>
-            <a:r>
-              <a:rPr lang="pt-BR" sz="2000" b="1" dirty="0">
-                <a:latin typeface="Times New Roman" panose="02020603050405020304" pitchFamily="18" charset="0"/>
-                <a:cs typeface="Times New Roman" panose="02020603050405020304" pitchFamily="18" charset="0"/>
-              </a:rPr>
-              <a:t>Deve ser gerado</a:t>
-            </a:r>
-            <a:r>
-              <a:rPr lang="pt-BR" sz="2000" dirty="0">
-                <a:latin typeface="Times New Roman" panose="02020603050405020304" pitchFamily="18" charset="0"/>
-                <a:cs typeface="Times New Roman" panose="02020603050405020304" pitchFamily="18" charset="0"/>
-              </a:rPr>
-              <a:t>: a) uma </a:t>
-            </a:r>
-            <a:r>
-              <a:rPr lang="pt-BR" sz="2000" b="1" dirty="0">
-                <a:latin typeface="Times New Roman" panose="02020603050405020304" pitchFamily="18" charset="0"/>
-                <a:cs typeface="Times New Roman" panose="02020603050405020304" pitchFamily="18" charset="0"/>
-              </a:rPr>
-              <a:t>chave SSH </a:t>
-            </a:r>
-            <a:r>
-              <a:rPr lang="pt-BR" sz="2000" dirty="0">
-                <a:latin typeface="Times New Roman" panose="02020603050405020304" pitchFamily="18" charset="0"/>
-                <a:cs typeface="Times New Roman" panose="02020603050405020304" pitchFamily="18" charset="0"/>
-              </a:rPr>
-              <a:t>no seu computador, </a:t>
-            </a:r>
-          </a:p>
-          <a:p>
-            <a:pPr marL="0" indent="0" algn="just">
-              <a:buNone/>
-            </a:pPr>
-            <a:r>
-              <a:rPr lang="pt-BR" sz="2000" dirty="0">
-                <a:latin typeface="Times New Roman" panose="02020603050405020304" pitchFamily="18" charset="0"/>
-                <a:cs typeface="Times New Roman" panose="02020603050405020304" pitchFamily="18" charset="0"/>
-              </a:rPr>
-              <a:t>                             b) cadastrar essa </a:t>
-            </a:r>
-            <a:r>
-              <a:rPr lang="pt-BR" sz="2000" b="1" dirty="0">
-                <a:latin typeface="Times New Roman" panose="02020603050405020304" pitchFamily="18" charset="0"/>
-                <a:cs typeface="Times New Roman" panose="02020603050405020304" pitchFamily="18" charset="0"/>
-              </a:rPr>
-              <a:t>chave SSH</a:t>
-            </a:r>
-            <a:r>
-              <a:rPr lang="pt-BR" sz="2000" dirty="0">
-                <a:latin typeface="Times New Roman" panose="02020603050405020304" pitchFamily="18" charset="0"/>
-                <a:cs typeface="Times New Roman" panose="02020603050405020304" pitchFamily="18" charset="0"/>
-              </a:rPr>
-              <a:t> no seu </a:t>
-            </a:r>
-            <a:r>
-              <a:rPr lang="pt-BR" sz="2000" dirty="0" err="1">
-                <a:latin typeface="Times New Roman" panose="02020603050405020304" pitchFamily="18" charset="0"/>
-                <a:cs typeface="Times New Roman" panose="02020603050405020304" pitchFamily="18" charset="0"/>
-              </a:rPr>
-              <a:t>Github</a:t>
-            </a:r>
-            <a:r>
-              <a:rPr lang="pt-BR" sz="2000" dirty="0">
-                <a:latin typeface="Times New Roman" panose="02020603050405020304" pitchFamily="18" charset="0"/>
-                <a:cs typeface="Times New Roman" panose="02020603050405020304" pitchFamily="18" charset="0"/>
-              </a:rPr>
-              <a:t>.</a:t>
-            </a:r>
+              <a:t>: Token</a:t>
+            </a:r>
+            <a:endParaRPr lang="pt-BR" sz="2000" b="1" dirty="0">
+              <a:solidFill>
+                <a:srgbClr val="FF0000"/>
+              </a:solidFill>
+              <a:latin typeface="Times New Roman" panose="02020603050405020304" pitchFamily="18" charset="0"/>
+              <a:cs typeface="Times New Roman" panose="02020603050405020304" pitchFamily="18" charset="0"/>
+            </a:endParaRPr>
+          </a:p>
+          <a:p>
+            <a:pPr marL="0" indent="0" algn="just">
+              <a:buNone/>
+            </a:pPr>
             <a:endParaRPr lang="pt-BR" sz="2000" b="1" dirty="0">
               <a:solidFill>
                 <a:srgbClr val="FF0000"/>
@@ -32360,6 +32371,141 @@
               </a:rPr>
               <a:t> master</a:t>
             </a:r>
+          </a:p>
+          <a:p>
+            <a:pPr marL="0" indent="0" algn="just">
+              <a:buNone/>
+            </a:pPr>
+            <a:r>
+              <a:rPr lang="pt-BR" sz="2000" b="1" dirty="0">
+                <a:solidFill>
+                  <a:srgbClr val="FF0000"/>
+                </a:solidFill>
+                <a:latin typeface="Times New Roman" panose="02020603050405020304" pitchFamily="18" charset="0"/>
+                <a:cs typeface="Times New Roman" panose="02020603050405020304" pitchFamily="18" charset="0"/>
+              </a:rPr>
+              <a:t>Atenção</a:t>
+            </a:r>
+            <a:r>
+              <a:rPr lang="pt-BR" sz="2000" dirty="0">
+                <a:latin typeface="Times New Roman" panose="02020603050405020304" pitchFamily="18" charset="0"/>
+                <a:cs typeface="Times New Roman" panose="02020603050405020304" pitchFamily="18" charset="0"/>
+              </a:rPr>
+              <a:t>: </a:t>
+            </a:r>
+            <a:r>
+              <a:rPr lang="pt-BR" sz="2000" b="1" dirty="0">
+                <a:solidFill>
+                  <a:srgbClr val="0070C0"/>
+                </a:solidFill>
+                <a:latin typeface="Times New Roman" panose="02020603050405020304" pitchFamily="18" charset="0"/>
+                <a:cs typeface="Times New Roman" panose="02020603050405020304" pitchFamily="18" charset="0"/>
+              </a:rPr>
+              <a:t>master ou </a:t>
+            </a:r>
+            <a:r>
+              <a:rPr lang="pt-BR" sz="2000" b="1" dirty="0" err="1">
+                <a:solidFill>
+                  <a:srgbClr val="0070C0"/>
+                </a:solidFill>
+                <a:latin typeface="Times New Roman" panose="02020603050405020304" pitchFamily="18" charset="0"/>
+                <a:cs typeface="Times New Roman" panose="02020603050405020304" pitchFamily="18" charset="0"/>
+              </a:rPr>
+              <a:t>main</a:t>
+            </a:r>
+            <a:r>
+              <a:rPr lang="pt-BR" sz="2000" b="1" dirty="0">
+                <a:solidFill>
+                  <a:srgbClr val="0070C0"/>
+                </a:solidFill>
+                <a:latin typeface="Times New Roman" panose="02020603050405020304" pitchFamily="18" charset="0"/>
+                <a:cs typeface="Times New Roman" panose="02020603050405020304" pitchFamily="18" charset="0"/>
+              </a:rPr>
+              <a:t>, </a:t>
+            </a:r>
+            <a:r>
+              <a:rPr lang="pt-BR" sz="2000" dirty="0">
+                <a:latin typeface="Times New Roman" panose="02020603050405020304" pitchFamily="18" charset="0"/>
+                <a:cs typeface="Times New Roman" panose="02020603050405020304" pitchFamily="18" charset="0"/>
+              </a:rPr>
+              <a:t>aonde será executado o, </a:t>
+            </a:r>
+            <a:r>
+              <a:rPr lang="pt-BR" sz="2000" b="1" dirty="0" err="1">
+                <a:solidFill>
+                  <a:srgbClr val="FF0000"/>
+                </a:solidFill>
+                <a:latin typeface="Times New Roman" panose="02020603050405020304" pitchFamily="18" charset="0"/>
+                <a:cs typeface="Times New Roman" panose="02020603050405020304" pitchFamily="18" charset="0"/>
+              </a:rPr>
+              <a:t>git</a:t>
+            </a:r>
+            <a:r>
+              <a:rPr lang="pt-BR" sz="2000" b="1" dirty="0">
+                <a:solidFill>
+                  <a:srgbClr val="FF0000"/>
+                </a:solidFill>
+                <a:latin typeface="Times New Roman" panose="02020603050405020304" pitchFamily="18" charset="0"/>
+                <a:cs typeface="Times New Roman" panose="02020603050405020304" pitchFamily="18" charset="0"/>
+              </a:rPr>
+              <a:t> </a:t>
+            </a:r>
+            <a:r>
+              <a:rPr lang="pt-BR" sz="2000" b="1" dirty="0" err="1">
+                <a:solidFill>
+                  <a:srgbClr val="FF0000"/>
+                </a:solidFill>
+                <a:latin typeface="Times New Roman" panose="02020603050405020304" pitchFamily="18" charset="0"/>
+                <a:cs typeface="Times New Roman" panose="02020603050405020304" pitchFamily="18" charset="0"/>
+              </a:rPr>
+              <a:t>push</a:t>
+            </a:r>
+            <a:r>
+              <a:rPr lang="pt-BR" sz="2000" b="1" dirty="0">
+                <a:solidFill>
+                  <a:srgbClr val="FF0000"/>
+                </a:solidFill>
+                <a:latin typeface="Times New Roman" panose="02020603050405020304" pitchFamily="18" charset="0"/>
+                <a:cs typeface="Times New Roman" panose="02020603050405020304" pitchFamily="18" charset="0"/>
+              </a:rPr>
+              <a:t> –u </a:t>
+            </a:r>
+            <a:r>
+              <a:rPr lang="pt-BR" sz="2000" b="1" dirty="0" err="1">
+                <a:solidFill>
+                  <a:srgbClr val="FF0000"/>
+                </a:solidFill>
+                <a:latin typeface="Times New Roman" panose="02020603050405020304" pitchFamily="18" charset="0"/>
+                <a:cs typeface="Times New Roman" panose="02020603050405020304" pitchFamily="18" charset="0"/>
+              </a:rPr>
+              <a:t>origin</a:t>
+            </a:r>
+            <a:r>
+              <a:rPr lang="pt-BR" sz="2000" b="1" dirty="0">
+                <a:solidFill>
+                  <a:srgbClr val="FF0000"/>
+                </a:solidFill>
+                <a:latin typeface="Times New Roman" panose="02020603050405020304" pitchFamily="18" charset="0"/>
+                <a:cs typeface="Times New Roman" panose="02020603050405020304" pitchFamily="18" charset="0"/>
+              </a:rPr>
+              <a:t> ???</a:t>
+            </a:r>
+            <a:r>
+              <a:rPr lang="pt-BR" sz="2000" dirty="0">
+                <a:latin typeface="Times New Roman" panose="02020603050405020304" pitchFamily="18" charset="0"/>
+                <a:cs typeface="Times New Roman" panose="02020603050405020304" pitchFamily="18" charset="0"/>
+              </a:rPr>
+              <a:t>.</a:t>
+            </a:r>
+          </a:p>
+          <a:p>
+            <a:pPr marL="0" indent="0" algn="just">
+              <a:buNone/>
+            </a:pPr>
+            <a:endParaRPr lang="pt-BR" sz="2000" dirty="0">
+              <a:latin typeface="Times New Roman" panose="02020603050405020304" pitchFamily="18" charset="0"/>
+              <a:cs typeface="Times New Roman" panose="02020603050405020304" pitchFamily="18" charset="0"/>
+            </a:endParaRPr>
           </a:p>
           <a:p>
             <a:pPr marL="0" indent="0" algn="just">

</xml_diff>